<commit_message>
Retour sur la soutenance
J’ai mis dans les commentaires vos retours
</commit_message>
<xml_diff>
--- a/TB.Soutenance.pptx
+++ b/TB.Soutenance.pptx
@@ -703,21 +703,211 @@
             </a:pPr>
             <a:r>
               <a:rPr lang="fr-FR" dirty="0" smtClean="0"/>
-              <a:t>Je vous souhaite à tous la bienvenue à ma soutenance de travail de Bachelor!</a:t>
-            </a:r>
-          </a:p>
-          <a:p>
-            <a:pPr marL="171450" indent="-171450">
+              <a:t>Faire</a:t>
+            </a:r>
+            <a:r>
+              <a:rPr lang="fr-FR" baseline="0" dirty="0" smtClean="0"/>
+              <a:t> une mise en contexte :</a:t>
+            </a:r>
+          </a:p>
+          <a:p>
+            <a:pPr marL="628650" lvl="1" indent="-171450">
               <a:buFont typeface="Arial" charset="0"/>
               <a:buChar char="•"/>
             </a:pPr>
             <a:r>
-              <a:rPr lang="fr-FR" dirty="0" smtClean="0"/>
-              <a:t>La</a:t>
-            </a:r>
-            <a:r>
               <a:rPr lang="fr-FR" baseline="0" dirty="0" smtClean="0"/>
-              <a:t> thématique est celle d’un jeu sérieux qui simule une entreprise sur un PGI</a:t>
+              <a:t>Qu’est-ce qu’un jeu sérieux ?</a:t>
+            </a:r>
+          </a:p>
+          <a:p>
+            <a:pPr marL="628650" lvl="1" indent="-171450">
+              <a:buFont typeface="Arial" charset="0"/>
+              <a:buChar char="•"/>
+            </a:pPr>
+            <a:r>
+              <a:rPr lang="fr-FR" baseline="0" dirty="0" smtClean="0"/>
+              <a:t>Qu’est-ce que cela apporte aux étudiants?</a:t>
+            </a:r>
+          </a:p>
+          <a:p>
+            <a:pPr marL="628650" lvl="1" indent="-171450">
+              <a:buFont typeface="Arial" charset="0"/>
+              <a:buChar char="•"/>
+            </a:pPr>
+            <a:r>
+              <a:rPr lang="fr-FR" baseline="0" dirty="0" smtClean="0"/>
+              <a:t>ERPSim, qu’est-ce qu’il apporte quelles sont ses faiblesses (C’est sur cette base là qu’il faut motiver le projet </a:t>
+            </a:r>
+            <a:r>
+              <a:rPr lang="fr-FR" baseline="0" dirty="0" err="1" smtClean="0"/>
+              <a:t>Odoosim</a:t>
+            </a:r>
+            <a:r>
+              <a:rPr lang="fr-FR" baseline="0" dirty="0" smtClean="0"/>
+              <a:t>).</a:t>
+            </a:r>
+          </a:p>
+          <a:p>
+            <a:pPr marL="171450" lvl="0" indent="-171450">
+              <a:buFont typeface="Arial" charset="0"/>
+              <a:buChar char="•"/>
+            </a:pPr>
+            <a:r>
+              <a:rPr lang="fr-FR" baseline="0" dirty="0" smtClean="0"/>
+              <a:t>Parler d’Odoo et expliquer les différents modes de consommation du service et expliquer pourquoi j’ai </a:t>
+            </a:r>
+            <a:r>
+              <a:rPr lang="fr-FR" baseline="0" smtClean="0"/>
+              <a:t>choisi celui-là (SAAS)</a:t>
+            </a:r>
+            <a:endParaRPr lang="fr-FR" baseline="0" dirty="0" smtClean="0"/>
+          </a:p>
+          <a:p>
+            <a:pPr marL="171450" lvl="0" indent="-171450">
+              <a:buFont typeface="Arial" charset="0"/>
+              <a:buChar char="•"/>
+            </a:pPr>
+            <a:r>
+              <a:rPr lang="fr-FR" baseline="0" dirty="0" smtClean="0"/>
+              <a:t>Ordre des slides par forcément judicieuse, revoir l’ordre des éléments!</a:t>
+            </a:r>
+          </a:p>
+          <a:p>
+            <a:pPr marL="171450" lvl="0" indent="-171450">
+              <a:buFont typeface="Arial" charset="0"/>
+              <a:buChar char="•"/>
+            </a:pPr>
+            <a:r>
+              <a:rPr lang="fr-FR" baseline="0" dirty="0" smtClean="0"/>
+              <a:t>Mettre moins de texte sur les diapositives</a:t>
+            </a:r>
+          </a:p>
+          <a:p>
+            <a:pPr marL="171450" lvl="0" indent="-171450">
+              <a:buFont typeface="Arial" charset="0"/>
+              <a:buChar char="•"/>
+            </a:pPr>
+            <a:r>
+              <a:rPr lang="fr-FR" baseline="0" dirty="0" smtClean="0"/>
+              <a:t>Mettre en place un diagramme global qui montre les types d’interactions (simulateur/participant) sur chacune des étapes du processus opérationnels.</a:t>
+            </a:r>
+          </a:p>
+          <a:p>
+            <a:pPr marL="171450" lvl="0" indent="-171450">
+              <a:buFont typeface="Arial" charset="0"/>
+              <a:buChar char="•"/>
+            </a:pPr>
+            <a:r>
+              <a:rPr lang="fr-FR" baseline="0" dirty="0" smtClean="0"/>
+              <a:t>Appuyer </a:t>
+            </a:r>
+            <a:r>
+              <a:rPr lang="fr-FR" baseline="0" dirty="0" err="1" smtClean="0"/>
+              <a:t>Odoosim</a:t>
+            </a:r>
+            <a:r>
+              <a:rPr lang="fr-FR" baseline="0" dirty="0" smtClean="0"/>
+              <a:t> en parlant de Business (ERP axé PME versus Multinationale (SAP)).</a:t>
+            </a:r>
+          </a:p>
+          <a:p>
+            <a:pPr marL="628650" lvl="1" indent="-171450">
+              <a:buFont typeface="Arial" charset="0"/>
+              <a:buChar char="•"/>
+            </a:pPr>
+            <a:r>
+              <a:rPr lang="fr-FR" baseline="0" dirty="0" smtClean="0"/>
+              <a:t>Quel impact financier (comparaison entre ERPSim et OdooSIM)</a:t>
+            </a:r>
+          </a:p>
+          <a:p>
+            <a:pPr marL="171450" lvl="0" indent="-171450">
+              <a:buFont typeface="Arial" charset="0"/>
+              <a:buChar char="•"/>
+            </a:pPr>
+            <a:r>
+              <a:rPr lang="fr-FR" baseline="0" dirty="0" smtClean="0"/>
+              <a:t>Plus parler de ce que j’ai fait : Présentation de l’algorithme en version diagramme pour que cela soit compréhensible!</a:t>
+            </a:r>
+          </a:p>
+          <a:p>
+            <a:pPr marL="628650" lvl="1" indent="-171450">
+              <a:buFont typeface="Arial" charset="0"/>
+              <a:buChar char="•"/>
+            </a:pPr>
+            <a:r>
+              <a:rPr lang="fr-FR" baseline="0" dirty="0" smtClean="0"/>
+              <a:t>Zoomer sur la partie des ventes -&gt; Montrer les interactions et le </a:t>
+            </a:r>
+            <a:r>
+              <a:rPr lang="fr-FR" baseline="0" smtClean="0"/>
+              <a:t>volume</a:t>
+            </a:r>
+            <a:r>
+              <a:rPr lang="fr-FR" baseline="0" smtClean="0"/>
+              <a:t>!</a:t>
+            </a:r>
+          </a:p>
+          <a:p>
+            <a:pPr marL="171450" lvl="0" indent="-171450">
+              <a:buFont typeface="Arial" charset="0"/>
+              <a:buChar char="•"/>
+            </a:pPr>
+            <a:r>
+              <a:rPr lang="fr-FR" baseline="0" smtClean="0"/>
+              <a:t>Pouvoir défendre mon projet par rapport à ERPSIM</a:t>
+            </a:r>
+          </a:p>
+          <a:p>
+            <a:pPr marL="628650" lvl="1" indent="-171450">
+              <a:buFont typeface="Arial" charset="0"/>
+              <a:buChar char="•"/>
+            </a:pPr>
+            <a:r>
+              <a:rPr lang="fr-FR" baseline="0" smtClean="0"/>
+              <a:t>Flexibilité dans le choix du scénario</a:t>
+            </a:r>
+          </a:p>
+          <a:p>
+            <a:pPr marL="628650" lvl="1" indent="-171450">
+              <a:buFont typeface="Arial" charset="0"/>
+              <a:buChar char="•"/>
+            </a:pPr>
+            <a:r>
+              <a:rPr lang="fr-FR" baseline="0" smtClean="0"/>
+              <a:t>Aspect financier</a:t>
+            </a:r>
+          </a:p>
+          <a:p>
+            <a:pPr marL="628650" lvl="1" indent="-171450">
+              <a:buFont typeface="Arial" charset="0"/>
+              <a:buChar char="•"/>
+            </a:pPr>
+            <a:r>
+              <a:rPr lang="fr-FR" baseline="0" smtClean="0"/>
+              <a:t>Activer/Désactiver des étapes du processus opérationnels</a:t>
+            </a:r>
+          </a:p>
+          <a:p>
+            <a:pPr marL="628650" lvl="1" indent="-171450">
+              <a:buFont typeface="Arial" charset="0"/>
+              <a:buChar char="•"/>
+            </a:pPr>
+            <a:endParaRPr lang="fr-FR" baseline="0" smtClean="0"/>
+          </a:p>
+          <a:p>
+            <a:pPr marL="0" lvl="0" indent="0">
+              <a:buFont typeface="Arial" charset="0"/>
+              <a:buNone/>
+            </a:pPr>
+            <a:r>
+              <a:rPr lang="fr-FR" baseline="0" smtClean="0"/>
+              <a:t>Boris m’a parlé qu’il serait bien de si je parle des « Job Aids » en distribuer à l’auditoire afin qu’il puisse comprendre de quoi il en est</a:t>
+            </a:r>
+            <a:r>
+              <a:rPr lang="is-IS" baseline="0" smtClean="0"/>
+              <a:t>…</a:t>
             </a:r>
             <a:endParaRPr lang="fr-FR" dirty="0"/>
           </a:p>
@@ -5881,7 +6071,6 @@
               <a:rPr lang="fr-FR" sz="2800" dirty="0" smtClean="0"/>
               <a:t>ODOOSIM</a:t>
             </a:r>
-            <a:endParaRPr lang="fr-FR" sz="2800" dirty="0" smtClean="0"/>
           </a:p>
           <a:p>
             <a:r>
@@ -6144,7 +6333,6 @@
               <a:rPr lang="fr-FR" dirty="0" smtClean="0"/>
               <a:t>Master Data</a:t>
             </a:r>
-            <a:endParaRPr lang="fr-FR" dirty="0" smtClean="0"/>
           </a:p>
         </p:txBody>
       </p:sp>
@@ -7720,15 +7908,7 @@
                   <a:srgbClr val="A14788"/>
                 </a:solidFill>
               </a:rPr>
-              <a:t>Avez-vous </a:t>
-            </a:r>
-            <a:r>
-              <a:rPr lang="fr-FR" sz="1800" dirty="0" smtClean="0">
-                <a:solidFill>
-                  <a:srgbClr val="A14788"/>
-                </a:solidFill>
-              </a:rPr>
-              <a:t>des questions ? </a:t>
+              <a:t>Avez-vous des questions ? </a:t>
             </a:r>
             <a:r>
               <a:rPr lang="fr-FR" sz="1800" dirty="0" smtClean="0">
@@ -9062,22 +9242,14 @@
           <a:p>
             <a:r>
               <a:rPr lang="fr-FR" dirty="0" smtClean="0"/>
-              <a:t>Fabrication </a:t>
-            </a:r>
-            <a:r>
-              <a:rPr lang="fr-FR" dirty="0" smtClean="0"/>
-              <a:t>et commercialisation</a:t>
+              <a:t>Fabrication et commercialisation</a:t>
             </a:r>
             <a:br>
               <a:rPr lang="fr-FR" dirty="0" smtClean="0"/>
             </a:br>
             <a:r>
               <a:rPr lang="fr-FR" dirty="0" smtClean="0"/>
-              <a:t>de </a:t>
-            </a:r>
-            <a:r>
-              <a:rPr lang="fr-FR" dirty="0" smtClean="0"/>
-              <a:t>quatre bières distinctes</a:t>
+              <a:t>de quatre bières distinctes</a:t>
             </a:r>
           </a:p>
           <a:p>
@@ -9106,14 +9278,12 @@
               <a:rPr lang="fr-FR" dirty="0" smtClean="0"/>
               <a:t>différents</a:t>
             </a:r>
-            <a:endParaRPr lang="fr-FR" dirty="0" smtClean="0"/>
           </a:p>
           <a:p>
             <a:r>
               <a:rPr lang="fr-FR" dirty="0" smtClean="0"/>
               <a:t>3 régions</a:t>
             </a:r>
-            <a:endParaRPr lang="fr-FR" dirty="0" smtClean="0"/>
           </a:p>
           <a:p>
             <a:endParaRPr lang="fr-FR" dirty="0" smtClean="0"/>
@@ -10411,11 +10581,7 @@
           <a:p>
             <a:r>
               <a:rPr lang="fr-FR" dirty="0" smtClean="0"/>
-              <a:t>Processus </a:t>
-            </a:r>
-            <a:r>
-              <a:rPr lang="fr-FR" dirty="0" smtClean="0"/>
-              <a:t>Brewery &amp; Co.</a:t>
+              <a:t>Processus Brewery &amp; Co.</a:t>
             </a:r>
             <a:endParaRPr lang="fr-FR" dirty="0"/>
           </a:p>

</xml_diff>